<commit_message>
Last Update 17-09-2018 14:02:18.62
</commit_message>
<xml_diff>
--- a/Slides/Unit 1/GE8151-U1-6-Algorithamic Problem Solving.pptx
+++ b/Slides/Unit 1/GE8151-U1-6-Algorithamic Problem Solving.pptx
@@ -202,7 +202,7 @@
             <a:fld id="{9515075B-F3F0-4441-A1BD-B7B515B708FF}" type="datetimeFigureOut">
               <a:rPr lang="en-US" smtClean="0"/>
               <a:pPr/>
-              <a:t>9/15/2018</a:t>
+              <a:t>9/17/2018</a:t>
             </a:fld>
             <a:endParaRPr lang="en-US"/>
           </a:p>
@@ -669,7 +669,7 @@
             <a:fld id="{6E658DF8-B8C0-4C7F-85EB-B53A2DDD44A9}" type="datetimeFigureOut">
               <a:rPr lang="en-US" smtClean="0"/>
               <a:pPr/>
-              <a:t>9/15/2018</a:t>
+              <a:t>9/17/2018</a:t>
             </a:fld>
             <a:endParaRPr lang="en-US"/>
           </a:p>
@@ -836,7 +836,7 @@
             <a:fld id="{6E658DF8-B8C0-4C7F-85EB-B53A2DDD44A9}" type="datetimeFigureOut">
               <a:rPr lang="en-US" smtClean="0"/>
               <a:pPr/>
-              <a:t>9/15/2018</a:t>
+              <a:t>9/17/2018</a:t>
             </a:fld>
             <a:endParaRPr lang="en-US"/>
           </a:p>
@@ -1013,7 +1013,7 @@
             <a:fld id="{6E658DF8-B8C0-4C7F-85EB-B53A2DDD44A9}" type="datetimeFigureOut">
               <a:rPr lang="en-US" smtClean="0"/>
               <a:pPr/>
-              <a:t>9/15/2018</a:t>
+              <a:t>9/17/2018</a:t>
             </a:fld>
             <a:endParaRPr lang="en-US"/>
           </a:p>
@@ -1212,7 +1212,7 @@
             <a:fld id="{6E658DF8-B8C0-4C7F-85EB-B53A2DDD44A9}" type="datetimeFigureOut">
               <a:rPr lang="en-US" smtClean="0"/>
               <a:pPr/>
-              <a:t>9/15/2018</a:t>
+              <a:t>9/17/2018</a:t>
             </a:fld>
             <a:endParaRPr lang="en-US"/>
           </a:p>
@@ -1455,7 +1455,7 @@
             <a:fld id="{6E658DF8-B8C0-4C7F-85EB-B53A2DDD44A9}" type="datetimeFigureOut">
               <a:rPr lang="en-US" smtClean="0"/>
               <a:pPr/>
-              <a:t>9/15/2018</a:t>
+              <a:t>9/17/2018</a:t>
             </a:fld>
             <a:endParaRPr lang="en-US"/>
           </a:p>
@@ -1740,7 +1740,7 @@
             <a:fld id="{6E658DF8-B8C0-4C7F-85EB-B53A2DDD44A9}" type="datetimeFigureOut">
               <a:rPr lang="en-US" smtClean="0"/>
               <a:pPr/>
-              <a:t>9/15/2018</a:t>
+              <a:t>9/17/2018</a:t>
             </a:fld>
             <a:endParaRPr lang="en-US"/>
           </a:p>
@@ -2159,7 +2159,7 @@
             <a:fld id="{6E658DF8-B8C0-4C7F-85EB-B53A2DDD44A9}" type="datetimeFigureOut">
               <a:rPr lang="en-US" smtClean="0"/>
               <a:pPr/>
-              <a:t>9/15/2018</a:t>
+              <a:t>9/17/2018</a:t>
             </a:fld>
             <a:endParaRPr lang="en-US"/>
           </a:p>
@@ -2274,7 +2274,7 @@
             <a:fld id="{6E658DF8-B8C0-4C7F-85EB-B53A2DDD44A9}" type="datetimeFigureOut">
               <a:rPr lang="en-US" smtClean="0"/>
               <a:pPr/>
-              <a:t>9/15/2018</a:t>
+              <a:t>9/17/2018</a:t>
             </a:fld>
             <a:endParaRPr lang="en-US"/>
           </a:p>
@@ -2366,7 +2366,7 @@
             <a:fld id="{6E658DF8-B8C0-4C7F-85EB-B53A2DDD44A9}" type="datetimeFigureOut">
               <a:rPr lang="en-US" smtClean="0"/>
               <a:pPr/>
-              <a:t>9/15/2018</a:t>
+              <a:t>9/17/2018</a:t>
             </a:fld>
             <a:endParaRPr lang="en-US"/>
           </a:p>
@@ -2640,7 +2640,7 @@
             <a:fld id="{6E658DF8-B8C0-4C7F-85EB-B53A2DDD44A9}" type="datetimeFigureOut">
               <a:rPr lang="en-US" smtClean="0"/>
               <a:pPr/>
-              <a:t>9/15/2018</a:t>
+              <a:t>9/17/2018</a:t>
             </a:fld>
             <a:endParaRPr lang="en-US"/>
           </a:p>
@@ -2894,7 +2894,7 @@
             <a:fld id="{6E658DF8-B8C0-4C7F-85EB-B53A2DDD44A9}" type="datetimeFigureOut">
               <a:rPr lang="en-US" smtClean="0"/>
               <a:pPr/>
-              <a:t>9/15/2018</a:t>
+              <a:t>9/17/2018</a:t>
             </a:fld>
             <a:endParaRPr lang="en-US"/>
           </a:p>
@@ -3116,7 +3116,7 @@
             <a:fld id="{6E658DF8-B8C0-4C7F-85EB-B53A2DDD44A9}" type="datetimeFigureOut">
               <a:rPr lang="en-US" smtClean="0"/>
               <a:pPr/>
-              <a:t>9/15/2018</a:t>
+              <a:t>9/17/2018</a:t>
             </a:fld>
             <a:endParaRPr lang="en-US"/>
           </a:p>
@@ -4366,11 +4366,7 @@
           <a:p>
             <a:r>
               <a:rPr lang="en-IN" dirty="0" smtClean="0"/>
-              <a:t>Time </a:t>
-            </a:r>
-            <a:r>
-              <a:rPr lang="en-IN" dirty="0" smtClean="0"/>
-              <a:t>Complexity</a:t>
+              <a:t>Time Complexity</a:t>
             </a:r>
           </a:p>
           <a:p>
@@ -4382,11 +4378,7 @@
           <a:p>
             <a:r>
               <a:rPr lang="en-IN" dirty="0" smtClean="0"/>
-              <a:t>Simplicity</a:t>
-            </a:r>
-            <a:r>
-              <a:rPr lang="en-IN" dirty="0" smtClean="0"/>
-              <a:t>.</a:t>
+              <a:t>Simplicity.</a:t>
             </a:r>
             <a:endParaRPr lang="en-US" dirty="0"/>
           </a:p>
@@ -4590,7 +4582,6 @@
               <a:rPr lang="en-IN" dirty="0" smtClean="0"/>
               <a:t>Based on the data there are three case of analysis</a:t>
             </a:r>
-            <a:endParaRPr lang="en-IN" dirty="0" smtClean="0"/>
           </a:p>
           <a:p>
             <a:pPr lvl="1"/>
@@ -4897,10 +4888,178 @@
         </p:nvSpPr>
         <p:spPr/>
         <p:txBody>
-          <a:bodyPr/>
-          <a:lstStyle/>
-          <a:p>
-            <a:endParaRPr lang="en-US"/>
+          <a:bodyPr>
+            <a:normAutofit fontScale="55000" lnSpcReduction="20000"/>
+          </a:bodyPr>
+          <a:lstStyle/>
+          <a:p>
+            <a:pPr>
+              <a:buNone/>
+            </a:pPr>
+            <a:r>
+              <a:rPr lang="en-IN" dirty="0" smtClean="0"/>
+              <a:t>START</a:t>
+            </a:r>
+          </a:p>
+          <a:p>
+            <a:pPr>
+              <a:buNone/>
+            </a:pPr>
+            <a:r>
+              <a:rPr lang="en-IN" dirty="0" smtClean="0"/>
+              <a:t>SET actual = 30</a:t>
+            </a:r>
+          </a:p>
+          <a:p>
+            <a:pPr>
+              <a:buNone/>
+            </a:pPr>
+            <a:r>
+              <a:rPr lang="en-IN" dirty="0" smtClean="0"/>
+              <a:t>PRINT “Enter any number”</a:t>
+            </a:r>
+            <a:r>
+              <a:rPr lang="en-IN" dirty="0" smtClean="0"/>
+              <a:t> </a:t>
+            </a:r>
+            <a:endParaRPr lang="en-IN" dirty="0" smtClean="0"/>
+          </a:p>
+          <a:p>
+            <a:pPr>
+              <a:buNone/>
+            </a:pPr>
+            <a:r>
+              <a:rPr lang="en-IN" dirty="0" smtClean="0"/>
+              <a:t>READ number</a:t>
+            </a:r>
+          </a:p>
+          <a:p>
+            <a:pPr>
+              <a:buNone/>
+            </a:pPr>
+            <a:r>
+              <a:rPr lang="en-IN" dirty="0" smtClean="0"/>
+              <a:t>WHILE number not equal to actual</a:t>
+            </a:r>
+          </a:p>
+          <a:p>
+            <a:pPr>
+              <a:buNone/>
+            </a:pPr>
+            <a:r>
+              <a:rPr lang="en-IN" dirty="0" smtClean="0"/>
+              <a:t>	</a:t>
+            </a:r>
+            <a:r>
+              <a:rPr lang="en-IN" dirty="0" smtClean="0"/>
+              <a:t>IF number &lt; actual THEN</a:t>
+            </a:r>
+          </a:p>
+          <a:p>
+            <a:pPr>
+              <a:buNone/>
+            </a:pPr>
+            <a:r>
+              <a:rPr lang="en-IN" dirty="0" smtClean="0"/>
+              <a:t>	</a:t>
+            </a:r>
+            <a:r>
+              <a:rPr lang="en-IN" dirty="0" smtClean="0"/>
+              <a:t>	PRINT “Try some higher number” </a:t>
+            </a:r>
+          </a:p>
+          <a:p>
+            <a:pPr>
+              <a:buNone/>
+            </a:pPr>
+            <a:r>
+              <a:rPr lang="en-IN" dirty="0" smtClean="0"/>
+              <a:t>	</a:t>
+            </a:r>
+            <a:r>
+              <a:rPr lang="en-IN" dirty="0" smtClean="0"/>
+              <a:t>ELSE</a:t>
+            </a:r>
+          </a:p>
+          <a:p>
+            <a:pPr>
+              <a:buNone/>
+            </a:pPr>
+            <a:r>
+              <a:rPr lang="en-IN" dirty="0" smtClean="0"/>
+              <a:t>	</a:t>
+            </a:r>
+            <a:r>
+              <a:rPr lang="en-IN" dirty="0" smtClean="0"/>
+              <a:t>	PRINT “Try some lower number”</a:t>
+            </a:r>
+          </a:p>
+          <a:p>
+            <a:pPr>
+              <a:buNone/>
+            </a:pPr>
+            <a:r>
+              <a:rPr lang="en-IN" dirty="0" smtClean="0"/>
+              <a:t>	</a:t>
+            </a:r>
+            <a:r>
+              <a:rPr lang="en-IN" dirty="0" smtClean="0"/>
+              <a:t>END IF</a:t>
+            </a:r>
+          </a:p>
+          <a:p>
+            <a:pPr>
+              <a:buNone/>
+            </a:pPr>
+            <a:r>
+              <a:rPr lang="en-IN" dirty="0" smtClean="0"/>
+              <a:t>	</a:t>
+            </a:r>
+            <a:r>
+              <a:rPr lang="en-IN" dirty="0" smtClean="0"/>
+              <a:t>PRINT “Enter any number”</a:t>
+            </a:r>
+          </a:p>
+          <a:p>
+            <a:pPr>
+              <a:buNone/>
+            </a:pPr>
+            <a:r>
+              <a:rPr lang="en-IN" dirty="0" smtClean="0"/>
+              <a:t>	</a:t>
+            </a:r>
+            <a:r>
+              <a:rPr lang="en-IN" dirty="0" smtClean="0"/>
+              <a:t>READ number</a:t>
+            </a:r>
+          </a:p>
+          <a:p>
+            <a:pPr>
+              <a:buNone/>
+            </a:pPr>
+            <a:r>
+              <a:rPr lang="en-IN" dirty="0" smtClean="0"/>
+              <a:t>END WHILE</a:t>
+            </a:r>
+          </a:p>
+          <a:p>
+            <a:pPr>
+              <a:buNone/>
+            </a:pPr>
+            <a:r>
+              <a:rPr lang="en-IN" dirty="0" smtClean="0"/>
+              <a:t>PRINT “You have found the number !!!”</a:t>
+            </a:r>
+          </a:p>
+          <a:p>
+            <a:pPr>
+              <a:buNone/>
+            </a:pPr>
+            <a:r>
+              <a:rPr lang="en-IN" dirty="0" smtClean="0"/>
+              <a:t>STOP</a:t>
+            </a:r>
+            <a:endParaRPr lang="en-US" dirty="0"/>
           </a:p>
         </p:txBody>
       </p:sp>

</xml_diff>